<commit_message>
Updated powerpoint with image of toll board on slide 3
</commit_message>
<xml_diff>
--- a/The Rebecca Riots.pptx
+++ b/The Rebecca Riots.pptx
@@ -124,348 +124,6 @@
     <p1510:client id="{229237A6-2F67-4708-BCE1-1E98F74BC6B0}" v="53" dt="2023-03-02T14:06:40.978"/>
   </p1510:revLst>
 </p1510:revInfo>
-</file>
-
-<file path=ppt/changesInfos/changesInfo1.xml><?xml version="1.0" encoding="utf-8"?>
-<pc:chgInfo xmlns:a="http://schemas.openxmlformats.org/drawingml/2006/main" xmlns:r="http://schemas.openxmlformats.org/officeDocument/2006/relationships" xmlns:ac="http://schemas.microsoft.com/office/drawing/2013/main/command" xmlns:pc="http://schemas.microsoft.com/office/powerpoint/2013/main/command">
-  <pc:docChgLst>
-    <pc:chgData name="Bee Phillips" userId="90b119c50b610e6b" providerId="LiveId" clId="{229237A6-2F67-4708-BCE1-1E98F74BC6B0}"/>
-    <pc:docChg chg="undo custSel addSld delSld modSld sldOrd">
-      <pc:chgData name="Bee Phillips" userId="90b119c50b610e6b" providerId="LiveId" clId="{229237A6-2F67-4708-BCE1-1E98F74BC6B0}" dt="2023-03-02T14:20:33.598" v="3394" actId="20577"/>
-      <pc:docMkLst>
-        <pc:docMk/>
-      </pc:docMkLst>
-      <pc:sldChg chg="modNotesTx">
-        <pc:chgData name="Bee Phillips" userId="90b119c50b610e6b" providerId="LiveId" clId="{229237A6-2F67-4708-BCE1-1E98F74BC6B0}" dt="2023-03-02T12:20:24.280" v="756" actId="20577"/>
-        <pc:sldMkLst>
-          <pc:docMk/>
-          <pc:sldMk cId="2348349914" sldId="256"/>
-        </pc:sldMkLst>
-      </pc:sldChg>
-      <pc:sldChg chg="addSp delSp modSp mod modTransition setBg setClrOvrMap modNotesTx">
-        <pc:chgData name="Bee Phillips" userId="90b119c50b610e6b" providerId="LiveId" clId="{229237A6-2F67-4708-BCE1-1E98F74BC6B0}" dt="2023-03-02T12:49:26.557" v="1275" actId="478"/>
-        <pc:sldMkLst>
-          <pc:docMk/>
-          <pc:sldMk cId="2200441287" sldId="257"/>
-        </pc:sldMkLst>
-        <pc:spChg chg="mod">
-          <ac:chgData name="Bee Phillips" userId="90b119c50b610e6b" providerId="LiveId" clId="{229237A6-2F67-4708-BCE1-1E98F74BC6B0}" dt="2023-03-02T12:05:02.347" v="380" actId="26606"/>
-          <ac:spMkLst>
-            <pc:docMk/>
-            <pc:sldMk cId="2200441287" sldId="257"/>
-            <ac:spMk id="2" creationId="{4359BE32-63F2-6FFB-006B-ED3387C1400C}"/>
-          </ac:spMkLst>
-        </pc:spChg>
-        <pc:spChg chg="mod">
-          <ac:chgData name="Bee Phillips" userId="90b119c50b610e6b" providerId="LiveId" clId="{229237A6-2F67-4708-BCE1-1E98F74BC6B0}" dt="2023-03-02T12:07:20.382" v="572" actId="20577"/>
-          <ac:spMkLst>
-            <pc:docMk/>
-            <pc:sldMk cId="2200441287" sldId="257"/>
-            <ac:spMk id="3" creationId="{A874183A-8EBE-9D00-F591-5B17333706CD}"/>
-          </ac:spMkLst>
-        </pc:spChg>
-        <pc:spChg chg="add del mod ord">
-          <ac:chgData name="Bee Phillips" userId="90b119c50b610e6b" providerId="LiveId" clId="{229237A6-2F67-4708-BCE1-1E98F74BC6B0}" dt="2023-03-02T12:49:26.557" v="1275" actId="478"/>
-          <ac:spMkLst>
-            <pc:docMk/>
-            <pc:sldMk cId="2200441287" sldId="257"/>
-            <ac:spMk id="6" creationId="{A75ABC25-2AAD-8C45-1AF9-3FB386E8C471}"/>
-          </ac:spMkLst>
-        </pc:spChg>
-        <pc:spChg chg="add">
-          <ac:chgData name="Bee Phillips" userId="90b119c50b610e6b" providerId="LiveId" clId="{229237A6-2F67-4708-BCE1-1E98F74BC6B0}" dt="2023-03-02T12:05:02.347" v="380" actId="26606"/>
-          <ac:spMkLst>
-            <pc:docMk/>
-            <pc:sldMk cId="2200441287" sldId="257"/>
-            <ac:spMk id="10" creationId="{EB6D1D7F-141C-4D8E-BFBA-D95B68E16385}"/>
-          </ac:spMkLst>
-        </pc:spChg>
-        <pc:spChg chg="add">
-          <ac:chgData name="Bee Phillips" userId="90b119c50b610e6b" providerId="LiveId" clId="{229237A6-2F67-4708-BCE1-1E98F74BC6B0}" dt="2023-03-02T12:05:02.347" v="380" actId="26606"/>
-          <ac:spMkLst>
-            <pc:docMk/>
-            <pc:sldMk cId="2200441287" sldId="257"/>
-            <ac:spMk id="12" creationId="{558DA214-7FDA-4C9D-A7CF-9AD725E290E1}"/>
-          </ac:spMkLst>
-        </pc:spChg>
-        <pc:picChg chg="add mod modCrop">
-          <ac:chgData name="Bee Phillips" userId="90b119c50b610e6b" providerId="LiveId" clId="{229237A6-2F67-4708-BCE1-1E98F74BC6B0}" dt="2023-03-02T12:06:01.482" v="571" actId="732"/>
-          <ac:picMkLst>
-            <pc:docMk/>
-            <pc:sldMk cId="2200441287" sldId="257"/>
-            <ac:picMk id="5" creationId="{7CB726E9-67D5-8384-8917-823202B85829}"/>
-          </ac:picMkLst>
-        </pc:picChg>
-      </pc:sldChg>
-      <pc:sldChg chg="addSp delSp modSp new mod modTransition setBg modNotesTx">
-        <pc:chgData name="Bee Phillips" userId="90b119c50b610e6b" providerId="LiveId" clId="{229237A6-2F67-4708-BCE1-1E98F74BC6B0}" dt="2023-03-02T14:04:04.259" v="2715" actId="26606"/>
-        <pc:sldMkLst>
-          <pc:docMk/>
-          <pc:sldMk cId="2020121832" sldId="258"/>
-        </pc:sldMkLst>
-        <pc:spChg chg="mod">
-          <ac:chgData name="Bee Phillips" userId="90b119c50b610e6b" providerId="LiveId" clId="{229237A6-2F67-4708-BCE1-1E98F74BC6B0}" dt="2023-03-02T12:45:55.528" v="1251" actId="26606"/>
-          <ac:spMkLst>
-            <pc:docMk/>
-            <pc:sldMk cId="2020121832" sldId="258"/>
-            <ac:spMk id="2" creationId="{A5AD2679-D16D-D3D8-7C72-1E6D3F256C94}"/>
-          </ac:spMkLst>
-        </pc:spChg>
-        <pc:spChg chg="mod ord">
-          <ac:chgData name="Bee Phillips" userId="90b119c50b610e6b" providerId="LiveId" clId="{229237A6-2F67-4708-BCE1-1E98F74BC6B0}" dt="2023-03-02T14:04:04.259" v="2715" actId="26606"/>
-          <ac:spMkLst>
-            <pc:docMk/>
-            <pc:sldMk cId="2020121832" sldId="258"/>
-            <ac:spMk id="3" creationId="{205AAC0C-C983-91C8-FF05-E095B7E04555}"/>
-          </ac:spMkLst>
-        </pc:spChg>
-        <pc:spChg chg="add del mod ord">
-          <ac:chgData name="Bee Phillips" userId="90b119c50b610e6b" providerId="LiveId" clId="{229237A6-2F67-4708-BCE1-1E98F74BC6B0}" dt="2023-03-02T12:49:22.408" v="1274" actId="478"/>
-          <ac:spMkLst>
-            <pc:docMk/>
-            <pc:sldMk cId="2020121832" sldId="258"/>
-            <ac:spMk id="6" creationId="{6EB7877C-D217-6825-4E2C-C8393183B2EF}"/>
-          </ac:spMkLst>
-        </pc:spChg>
-        <pc:spChg chg="add del">
-          <ac:chgData name="Bee Phillips" userId="90b119c50b610e6b" providerId="LiveId" clId="{229237A6-2F67-4708-BCE1-1E98F74BC6B0}" dt="2023-03-02T12:45:55.522" v="1250" actId="26606"/>
-          <ac:spMkLst>
-            <pc:docMk/>
-            <pc:sldMk cId="2020121832" sldId="258"/>
-            <ac:spMk id="10" creationId="{EB6D1D7F-141C-4D8E-BFBA-D95B68E16385}"/>
-          </ac:spMkLst>
-        </pc:spChg>
-        <pc:spChg chg="add del">
-          <ac:chgData name="Bee Phillips" userId="90b119c50b610e6b" providerId="LiveId" clId="{229237A6-2F67-4708-BCE1-1E98F74BC6B0}" dt="2023-03-02T12:45:55.522" v="1250" actId="26606"/>
-          <ac:spMkLst>
-            <pc:docMk/>
-            <pc:sldMk cId="2020121832" sldId="258"/>
-            <ac:spMk id="12" creationId="{558DA214-7FDA-4C9D-A7CF-9AD725E290E1}"/>
-          </ac:spMkLst>
-        </pc:spChg>
-        <pc:spChg chg="add del">
-          <ac:chgData name="Bee Phillips" userId="90b119c50b610e6b" providerId="LiveId" clId="{229237A6-2F67-4708-BCE1-1E98F74BC6B0}" dt="2023-03-02T12:45:55.522" v="1250" actId="26606"/>
-          <ac:spMkLst>
-            <pc:docMk/>
-            <pc:sldMk cId="2020121832" sldId="258"/>
-            <ac:spMk id="14" creationId="{A77F89CE-BF52-4AF5-8B0B-7E9693734EDE}"/>
-          </ac:spMkLst>
-        </pc:spChg>
-        <pc:spChg chg="add del">
-          <ac:chgData name="Bee Phillips" userId="90b119c50b610e6b" providerId="LiveId" clId="{229237A6-2F67-4708-BCE1-1E98F74BC6B0}" dt="2023-03-02T14:04:04.259" v="2715" actId="26606"/>
-          <ac:spMkLst>
-            <pc:docMk/>
-            <pc:sldMk cId="2020121832" sldId="258"/>
-            <ac:spMk id="16" creationId="{EB6D1D7F-141C-4D8E-BFBA-D95B68E16385}"/>
-          </ac:spMkLst>
-        </pc:spChg>
-        <pc:spChg chg="add del">
-          <ac:chgData name="Bee Phillips" userId="90b119c50b610e6b" providerId="LiveId" clId="{229237A6-2F67-4708-BCE1-1E98F74BC6B0}" dt="2023-03-02T14:04:04.259" v="2715" actId="26606"/>
-          <ac:spMkLst>
-            <pc:docMk/>
-            <pc:sldMk cId="2020121832" sldId="258"/>
-            <ac:spMk id="17" creationId="{245B42B6-26F8-4E25-839B-FB38F13BEFFC}"/>
-          </ac:spMkLst>
-        </pc:spChg>
-        <pc:spChg chg="add del">
-          <ac:chgData name="Bee Phillips" userId="90b119c50b610e6b" providerId="LiveId" clId="{229237A6-2F67-4708-BCE1-1E98F74BC6B0}" dt="2023-03-02T14:04:04.257" v="2714" actId="26606"/>
-          <ac:spMkLst>
-            <pc:docMk/>
-            <pc:sldMk cId="2020121832" sldId="258"/>
-            <ac:spMk id="22" creationId="{EB6D1D7F-141C-4D8E-BFBA-D95B68E16385}"/>
-          </ac:spMkLst>
-        </pc:spChg>
-        <pc:spChg chg="add del">
-          <ac:chgData name="Bee Phillips" userId="90b119c50b610e6b" providerId="LiveId" clId="{229237A6-2F67-4708-BCE1-1E98F74BC6B0}" dt="2023-03-02T14:04:04.257" v="2714" actId="26606"/>
-          <ac:spMkLst>
-            <pc:docMk/>
-            <pc:sldMk cId="2020121832" sldId="258"/>
-            <ac:spMk id="24" creationId="{245B42B6-26F8-4E25-839B-FB38F13BEFFC}"/>
-          </ac:spMkLst>
-        </pc:spChg>
-        <pc:spChg chg="add">
-          <ac:chgData name="Bee Phillips" userId="90b119c50b610e6b" providerId="LiveId" clId="{229237A6-2F67-4708-BCE1-1E98F74BC6B0}" dt="2023-03-02T14:04:04.259" v="2715" actId="26606"/>
-          <ac:spMkLst>
-            <pc:docMk/>
-            <pc:sldMk cId="2020121832" sldId="258"/>
-            <ac:spMk id="26" creationId="{F58FB36D-73B3-45EF-8CD4-221CCC8BE09F}"/>
-          </ac:spMkLst>
-        </pc:spChg>
-        <pc:spChg chg="add">
-          <ac:chgData name="Bee Phillips" userId="90b119c50b610e6b" providerId="LiveId" clId="{229237A6-2F67-4708-BCE1-1E98F74BC6B0}" dt="2023-03-02T14:04:04.259" v="2715" actId="26606"/>
-          <ac:spMkLst>
-            <pc:docMk/>
-            <pc:sldMk cId="2020121832" sldId="258"/>
-            <ac:spMk id="27" creationId="{4D7835D7-DF12-420F-843A-1C5083D2B3F8}"/>
-          </ac:spMkLst>
-        </pc:spChg>
-        <pc:picChg chg="add mod ord">
-          <ac:chgData name="Bee Phillips" userId="90b119c50b610e6b" providerId="LiveId" clId="{229237A6-2F67-4708-BCE1-1E98F74BC6B0}" dt="2023-03-02T14:04:04.259" v="2715" actId="26606"/>
-          <ac:picMkLst>
-            <pc:docMk/>
-            <pc:sldMk cId="2020121832" sldId="258"/>
-            <ac:picMk id="5" creationId="{1F147217-A865-8D85-CB24-E39A2D67D70B}"/>
-          </ac:picMkLst>
-        </pc:picChg>
-      </pc:sldChg>
-      <pc:sldChg chg="addSp delSp modSp new mod">
-        <pc:chgData name="Bee Phillips" userId="90b119c50b610e6b" providerId="LiveId" clId="{229237A6-2F67-4708-BCE1-1E98F74BC6B0}" dt="2023-03-02T13:19:35.690" v="2275" actId="12100"/>
-        <pc:sldMkLst>
-          <pc:docMk/>
-          <pc:sldMk cId="822580603" sldId="259"/>
-        </pc:sldMkLst>
-        <pc:spChg chg="mod">
-          <ac:chgData name="Bee Phillips" userId="90b119c50b610e6b" providerId="LiveId" clId="{229237A6-2F67-4708-BCE1-1E98F74BC6B0}" dt="2023-03-02T13:11:05.535" v="1921" actId="20577"/>
-          <ac:spMkLst>
-            <pc:docMk/>
-            <pc:sldMk cId="822580603" sldId="259"/>
-            <ac:spMk id="2" creationId="{D1510469-B145-E0CD-24C1-3A0DF09A055B}"/>
-          </ac:spMkLst>
-        </pc:spChg>
-        <pc:spChg chg="add del mod">
-          <ac:chgData name="Bee Phillips" userId="90b119c50b610e6b" providerId="LiveId" clId="{229237A6-2F67-4708-BCE1-1E98F74BC6B0}" dt="2023-03-02T13:18:18.795" v="2273" actId="26606"/>
-          <ac:spMkLst>
-            <pc:docMk/>
-            <pc:sldMk cId="822580603" sldId="259"/>
-            <ac:spMk id="3" creationId="{06360D5C-0742-76D8-BB27-6C08E87E6889}"/>
-          </ac:spMkLst>
-        </pc:spChg>
-        <pc:graphicFrameChg chg="add del">
-          <ac:chgData name="Bee Phillips" userId="90b119c50b610e6b" providerId="LiveId" clId="{229237A6-2F67-4708-BCE1-1E98F74BC6B0}" dt="2023-03-02T13:14:26.717" v="2100" actId="26606"/>
-          <ac:graphicFrameMkLst>
-            <pc:docMk/>
-            <pc:sldMk cId="822580603" sldId="259"/>
-            <ac:graphicFrameMk id="5" creationId="{A64D873B-46FC-8DCB-1B7F-D258FD6D7AF8}"/>
-          </ac:graphicFrameMkLst>
-        </pc:graphicFrameChg>
-        <pc:graphicFrameChg chg="add mod">
-          <ac:chgData name="Bee Phillips" userId="90b119c50b610e6b" providerId="LiveId" clId="{229237A6-2F67-4708-BCE1-1E98F74BC6B0}" dt="2023-03-02T13:19:35.690" v="2275" actId="12100"/>
-          <ac:graphicFrameMkLst>
-            <pc:docMk/>
-            <pc:sldMk cId="822580603" sldId="259"/>
-            <ac:graphicFrameMk id="6" creationId="{B7B0D053-641A-0C58-EED9-76937135B44C}"/>
-          </ac:graphicFrameMkLst>
-        </pc:graphicFrameChg>
-      </pc:sldChg>
-      <pc:sldChg chg="addSp delSp modSp new mod modClrScheme chgLayout">
-        <pc:chgData name="Bee Phillips" userId="90b119c50b610e6b" providerId="LiveId" clId="{229237A6-2F67-4708-BCE1-1E98F74BC6B0}" dt="2023-03-02T13:10:55.382" v="1907" actId="20577"/>
-        <pc:sldMkLst>
-          <pc:docMk/>
-          <pc:sldMk cId="1805653995" sldId="260"/>
-        </pc:sldMkLst>
-        <pc:spChg chg="mod ord">
-          <ac:chgData name="Bee Phillips" userId="90b119c50b610e6b" providerId="LiveId" clId="{229237A6-2F67-4708-BCE1-1E98F74BC6B0}" dt="2023-03-02T13:10:55.382" v="1907" actId="20577"/>
-          <ac:spMkLst>
-            <pc:docMk/>
-            <pc:sldMk cId="1805653995" sldId="260"/>
-            <ac:spMk id="2" creationId="{10EEAFFF-E17D-F63D-A3C1-7C07473A18FF}"/>
-          </ac:spMkLst>
-        </pc:spChg>
-        <pc:spChg chg="del mod ord">
-          <ac:chgData name="Bee Phillips" userId="90b119c50b610e6b" providerId="LiveId" clId="{229237A6-2F67-4708-BCE1-1E98F74BC6B0}" dt="2023-03-02T13:09:43.433" v="1673" actId="700"/>
-          <ac:spMkLst>
-            <pc:docMk/>
-            <pc:sldMk cId="1805653995" sldId="260"/>
-            <ac:spMk id="3" creationId="{8E301167-944E-3EDC-FEF6-66B53A6D4630}"/>
-          </ac:spMkLst>
-        </pc:spChg>
-        <pc:spChg chg="add mod ord">
-          <ac:chgData name="Bee Phillips" userId="90b119c50b610e6b" providerId="LiveId" clId="{229237A6-2F67-4708-BCE1-1E98F74BC6B0}" dt="2023-03-02T13:09:43.433" v="1673" actId="700"/>
-          <ac:spMkLst>
-            <pc:docMk/>
-            <pc:sldMk cId="1805653995" sldId="260"/>
-            <ac:spMk id="4" creationId="{1286F728-6F80-965C-5EE5-13DAA76AB7EA}"/>
-          </ac:spMkLst>
-        </pc:spChg>
-      </pc:sldChg>
-      <pc:sldChg chg="addSp delSp modSp new del mod modTransition modNotesTx">
-        <pc:chgData name="Bee Phillips" userId="90b119c50b610e6b" providerId="LiveId" clId="{229237A6-2F67-4708-BCE1-1E98F74BC6B0}" dt="2023-03-02T14:06:47.658" v="2725" actId="47"/>
-        <pc:sldMkLst>
-          <pc:docMk/>
-          <pc:sldMk cId="3947446917" sldId="261"/>
-        </pc:sldMkLst>
-        <pc:spChg chg="mod">
-          <ac:chgData name="Bee Phillips" userId="90b119c50b610e6b" providerId="LiveId" clId="{229237A6-2F67-4708-BCE1-1E98F74BC6B0}" dt="2023-03-02T13:47:46.386" v="2521" actId="20577"/>
-          <ac:spMkLst>
-            <pc:docMk/>
-            <pc:sldMk cId="3947446917" sldId="261"/>
-            <ac:spMk id="2" creationId="{55CEBB4D-96A6-FE9D-9F33-D0813495CCAD}"/>
-          </ac:spMkLst>
-        </pc:spChg>
-        <pc:spChg chg="del mod">
-          <ac:chgData name="Bee Phillips" userId="90b119c50b610e6b" providerId="LiveId" clId="{229237A6-2F67-4708-BCE1-1E98F74BC6B0}" dt="2023-03-02T13:53:15.431" v="2646" actId="26606"/>
-          <ac:spMkLst>
-            <pc:docMk/>
-            <pc:sldMk cId="3947446917" sldId="261"/>
-            <ac:spMk id="3" creationId="{12FD445E-AEB9-0B4A-610B-E4EC29666D14}"/>
-          </ac:spMkLst>
-        </pc:spChg>
-        <pc:spChg chg="add del mod">
-          <ac:chgData name="Bee Phillips" userId="90b119c50b610e6b" providerId="LiveId" clId="{229237A6-2F67-4708-BCE1-1E98F74BC6B0}" dt="2023-03-02T14:03:28.368" v="2711"/>
-          <ac:spMkLst>
-            <pc:docMk/>
-            <pc:sldMk cId="3947446917" sldId="261"/>
-            <ac:spMk id="4" creationId="{2CA91894-3268-FB47-3871-2B183A104C45}"/>
-          </ac:spMkLst>
-        </pc:spChg>
-        <pc:graphicFrameChg chg="add mod">
-          <ac:chgData name="Bee Phillips" userId="90b119c50b610e6b" providerId="LiveId" clId="{229237A6-2F67-4708-BCE1-1E98F74BC6B0}" dt="2023-03-02T13:57:18.151" v="2661" actId="12100"/>
-          <ac:graphicFrameMkLst>
-            <pc:docMk/>
-            <pc:sldMk cId="3947446917" sldId="261"/>
-            <ac:graphicFrameMk id="5" creationId="{7272FA61-BE2A-E299-A0C3-3297FB862E7C}"/>
-          </ac:graphicFrameMkLst>
-        </pc:graphicFrameChg>
-      </pc:sldChg>
-      <pc:sldChg chg="add del ord">
-        <pc:chgData name="Bee Phillips" userId="90b119c50b610e6b" providerId="LiveId" clId="{229237A6-2F67-4708-BCE1-1E98F74BC6B0}" dt="2023-03-02T14:06:08.328" v="2719" actId="47"/>
-        <pc:sldMkLst>
-          <pc:docMk/>
-          <pc:sldMk cId="914941796" sldId="262"/>
-        </pc:sldMkLst>
-      </pc:sldChg>
-      <pc:sldChg chg="addSp delSp modSp add mod modNotesTx">
-        <pc:chgData name="Bee Phillips" userId="90b119c50b610e6b" providerId="LiveId" clId="{229237A6-2F67-4708-BCE1-1E98F74BC6B0}" dt="2023-03-02T14:20:33.598" v="3394" actId="20577"/>
-        <pc:sldMkLst>
-          <pc:docMk/>
-          <pc:sldMk cId="1282020040" sldId="262"/>
-        </pc:sldMkLst>
-        <pc:spChg chg="del mod">
-          <ac:chgData name="Bee Phillips" userId="90b119c50b610e6b" providerId="LiveId" clId="{229237A6-2F67-4708-BCE1-1E98F74BC6B0}" dt="2023-03-02T14:06:21.012" v="2722" actId="478"/>
-          <ac:spMkLst>
-            <pc:docMk/>
-            <pc:sldMk cId="1282020040" sldId="262"/>
-            <ac:spMk id="3" creationId="{205AAC0C-C983-91C8-FF05-E095B7E04555}"/>
-          </ac:spMkLst>
-        </pc:spChg>
-        <pc:spChg chg="add del mod">
-          <ac:chgData name="Bee Phillips" userId="90b119c50b610e6b" providerId="LiveId" clId="{229237A6-2F67-4708-BCE1-1E98F74BC6B0}" dt="2023-03-02T14:06:40.977" v="2724"/>
-          <ac:spMkLst>
-            <pc:docMk/>
-            <pc:sldMk cId="1282020040" sldId="262"/>
-            <ac:spMk id="6" creationId="{2C2D5C63-2B5A-A6C5-A053-B9CF9611E753}"/>
-          </ac:spMkLst>
-        </pc:spChg>
-        <pc:graphicFrameChg chg="add mod">
-          <ac:chgData name="Bee Phillips" userId="90b119c50b610e6b" providerId="LiveId" clId="{229237A6-2F67-4708-BCE1-1E98F74BC6B0}" dt="2023-03-02T14:06:40.977" v="2724"/>
-          <ac:graphicFrameMkLst>
-            <pc:docMk/>
-            <pc:sldMk cId="1282020040" sldId="262"/>
-            <ac:graphicFrameMk id="7" creationId="{94E33609-3B43-E29C-BCA8-22EF268D2CAF}"/>
-          </ac:graphicFrameMkLst>
-        </pc:graphicFrameChg>
-        <pc:picChg chg="del">
-          <ac:chgData name="Bee Phillips" userId="90b119c50b610e6b" providerId="LiveId" clId="{229237A6-2F67-4708-BCE1-1E98F74BC6B0}" dt="2023-03-02T14:06:29.638" v="2723" actId="478"/>
-          <ac:picMkLst>
-            <pc:docMk/>
-            <pc:sldMk cId="1282020040" sldId="262"/>
-            <ac:picMk id="5" creationId="{1F147217-A865-8D85-CB24-E39A2D67D70B}"/>
-          </ac:picMkLst>
-        </pc:picChg>
-      </pc:sldChg>
-    </pc:docChg>
-  </pc:docChgLst>
-</pc:chgInfo>
 </file>
 
 <file path=ppt/diagrams/colors1.xml><?xml version="1.0" encoding="utf-8"?>
@@ -2630,7 +2288,7 @@
             </a:lnSpc>
           </a:pPr>
           <a:r>
-            <a:rPr lang="en-US"/>
+            <a:rPr lang="en-US" dirty="0"/>
             <a:t>Since I want my game to be very story based, have you played any story-based games that you’ve really liked? </a:t>
           </a:r>
         </a:p>
@@ -3976,7 +3634,7 @@
             <a:buNone/>
           </a:pPr>
           <a:r>
-            <a:rPr lang="en-US" sz="1800" kern="1200"/>
+            <a:rPr lang="en-US" sz="1800" kern="1200" dirty="0"/>
             <a:t>Since I want my game to be very story based, have you played any story-based games that you’ve really liked? </a:t>
           </a:r>
         </a:p>
@@ -7682,11 +7340,7 @@
           <a:p>
             <a:r>
               <a:rPr lang="en-US" dirty="0"/>
-              <a:t>Comment on each point. Lighthearted because I want the game to actually be fun to play and not make the player sad, story based so we can actually tell the story of the riots, but I want it to be interactive too. Different endings so playing the game twice is still interesting, different characters and their different cargo mean you have to figure out the toll needed for a wide variety of characters</a:t>
-            </a:r>
-            <a:r>
-              <a:rPr lang="en-US"/>
-              <a:t>. </a:t>
+              <a:t>Comment on each point. Lighthearted because I want the game to actually be fun to play and not make the player sad, story based so we can actually tell the story of the riots, but I want it to be interactive too. Different endings so playing the game twice is still interesting, different characters and their different cargo mean you have to figure out the toll needed for a wide variety of characters. </a:t>
             </a:r>
             <a:endParaRPr lang="en-GB" dirty="0"/>
           </a:p>
@@ -11948,7 +11602,7 @@
       </p:grpSpPr>
       <p:sp useBgFill="1">
         <p:nvSpPr>
-          <p:cNvPr id="26" name="Rectangle 21">
+          <p:cNvPr id="36" name="Rectangle 31">
             <a:extLst>
               <a:ext uri="{FF2B5EF4-FFF2-40B4-BE49-F238E27FC236}">
                 <a16:creationId xmlns:a16="http://schemas.microsoft.com/office/drawing/2014/main" id="{F58FB36D-73B3-45EF-8CD4-221CCC8BE09F}"/>
@@ -12008,7 +11662,7 @@
       </p:sp>
       <p:sp>
         <p:nvSpPr>
-          <p:cNvPr id="27" name="Rectangle 23">
+          <p:cNvPr id="37" name="Rectangle 33">
             <a:extLst>
               <a:ext uri="{FF2B5EF4-FFF2-40B4-BE49-F238E27FC236}">
                 <a16:creationId xmlns:a16="http://schemas.microsoft.com/office/drawing/2014/main" id="{4D7835D7-DF12-420F-843A-1C5083D2B3F8}"/>
@@ -12148,10 +11802,10 @@
       </p:sp>
       <p:pic>
         <p:nvPicPr>
-          <p:cNvPr id="5" name="Graphic 4" descr="Fork In Road with solid fill">
+          <p:cNvPr id="8" name="Picture 7" descr="A close-up of a document&#10;&#10;Description automatically generated with medium confidence">
             <a:extLst>
               <a:ext uri="{FF2B5EF4-FFF2-40B4-BE49-F238E27FC236}">
-                <a16:creationId xmlns:a16="http://schemas.microsoft.com/office/drawing/2014/main" id="{1F147217-A865-8D85-CB24-E39A2D67D70B}"/>
+                <a16:creationId xmlns:a16="http://schemas.microsoft.com/office/drawing/2014/main" id="{E661C2EC-6436-0165-446B-442D788D42FA}"/>
               </a:ext>
             </a:extLst>
           </p:cNvPr>
@@ -12166,9 +11820,6 @@
               <a:ext uri="{28A0092B-C50C-407E-A947-70E740481C1C}">
                 <a14:useLocalDpi xmlns:a14="http://schemas.microsoft.com/office/drawing/2010/main" val="0"/>
               </a:ext>
-              <a:ext uri="{96DAC541-7B7A-43D3-8B79-37D633B846F1}">
-                <asvg:svgBlip xmlns:asvg="http://schemas.microsoft.com/office/drawing/2016/SVG/main" r:embed="rId4"/>
-              </a:ext>
             </a:extLst>
           </a:blip>
           <a:stretch>
@@ -12177,8 +11828,8 @@
         </p:blipFill>
         <p:spPr>
           <a:xfrm>
-            <a:off x="7857175" y="2852382"/>
-            <a:ext cx="3364792" cy="3364792"/>
+            <a:off x="7925392" y="2499280"/>
+            <a:ext cx="3303440" cy="4040906"/>
           </a:xfrm>
           <a:prstGeom prst="rect">
             <a:avLst/>

</xml_diff>

<commit_message>
Updated so all slides have slide transitions
</commit_message>
<xml_diff>
--- a/The Rebecca Riots.pptx
+++ b/The Rebecca Riots.pptx
@@ -116,14 +116,6 @@
     </a:lvl9pPr>
   </p:defaultTextStyle>
 </p:presentation>
-</file>
-
-<file path=ppt/revisionInfo.xml><?xml version="1.0" encoding="utf-8"?>
-<p1510:revInfo xmlns:a="http://schemas.openxmlformats.org/drawingml/2006/main" xmlns:r="http://schemas.openxmlformats.org/officeDocument/2006/relationships" xmlns:p1510="http://schemas.microsoft.com/office/powerpoint/2015/10/main">
-  <p1510:revLst>
-    <p1510:client id="{229237A6-2F67-4708-BCE1-1E98F74BC6B0}" v="53" dt="2023-03-02T14:06:40.978"/>
-  </p1510:revLst>
-</p1510:revInfo>
 </file>
 
 <file path=ppt/diagrams/colors1.xml><?xml version="1.0" encoding="utf-8"?>
@@ -12166,6 +12158,18 @@
   <p:clrMapOvr>
     <a:masterClrMapping/>
   </p:clrMapOvr>
+  <mc:AlternateContent xmlns:mc="http://schemas.openxmlformats.org/markup-compatibility/2006">
+    <mc:Choice xmlns:p14="http://schemas.microsoft.com/office/powerpoint/2010/main" Requires="p14">
+      <p:transition spd="med" p14:dur="700">
+        <p:fade/>
+      </p:transition>
+    </mc:Choice>
+    <mc:Fallback>
+      <p:transition spd="med">
+        <p:fade/>
+      </p:transition>
+    </mc:Fallback>
+  </mc:AlternateContent>
 </p:sld>
 </file>
 
@@ -12258,6 +12262,9 @@
   <p:clrMapOvr>
     <a:masterClrMapping/>
   </p:clrMapOvr>
+  <p:transition spd="slow">
+    <p:fade thruBlk="1"/>
+  </p:transition>
 </p:sld>
 </file>
 

</xml_diff>

<commit_message>
Slightly altered wording, changed saturation of image on second slide to fit more with the rest of the presentation
</commit_message>
<xml_diff>
--- a/The Rebecca Riots.pptx
+++ b/The Rebecca Riots.pptx
@@ -1767,14 +1767,14 @@
             </a:lnSpc>
           </a:pPr>
           <a:r>
-            <a:rPr lang="en-US" baseline="0"/>
+            <a:rPr lang="en-US" baseline="0" dirty="0"/>
             <a:t>Lighthearted</a:t>
           </a:r>
           <a:r>
-            <a:rPr lang="en-GB" baseline="0"/>
-            <a:t>, and hopefully even funny, but based on real events.</a:t>
+            <a:rPr lang="en-GB" baseline="0" dirty="0"/>
+            <a:t>, hopefully funny, but based on real events.</a:t>
           </a:r>
-          <a:endParaRPr lang="en-US"/>
+          <a:endParaRPr lang="en-US" dirty="0"/>
         </a:p>
       </dgm:t>
     </dgm:pt>
@@ -1913,7 +1913,7 @@
           </a:pPr>
           <a:r>
             <a:rPr lang="en-US" baseline="0" dirty="0"/>
-            <a:t>Full of different characters trying to use the toll road.</a:t>
+            <a:t>Full of different characters and their cargo trying to use the toll road.</a:t>
           </a:r>
           <a:endParaRPr lang="en-US" dirty="0"/>
         </a:p>
@@ -2226,16 +2226,8 @@
             </a:lnSpc>
           </a:pPr>
           <a:r>
-            <a:rPr lang="en-US"/>
-            <a:t>Is there any museum displays that </a:t>
-          </a:r>
-          <a:r>
-            <a:rPr lang="en-US" b="1"/>
-            <a:t>you</a:t>
-          </a:r>
-          <a:r>
-            <a:rPr lang="en-US"/>
-            <a:t> really liked that you could tell me about?</a:t>
+            <a:rPr lang="en-US" dirty="0"/>
+            <a:t>Is there any museum displays that you’ve seen that have stuck with you?</a:t>
           </a:r>
         </a:p>
       </dgm:t>
@@ -2281,7 +2273,7 @@
           </a:pPr>
           <a:r>
             <a:rPr lang="en-US" dirty="0"/>
-            <a:t>Since I want my game to be very story based, have you played any story-based games that you’ve really liked? </a:t>
+            <a:t>Since I want my game to be very story based, what elements make a good story in your opinion?</a:t>
           </a:r>
         </a:p>
       </dgm:t>
@@ -2326,7 +2318,7 @@
             </a:lnSpc>
           </a:pPr>
           <a:r>
-            <a:rPr lang="en-US"/>
+            <a:rPr lang="en-US" dirty="0"/>
             <a:t>Do you have any ideas for this game? What kind of things would you add if you were making it?</a:t>
           </a:r>
         </a:p>
@@ -2372,8 +2364,8 @@
             </a:lnSpc>
           </a:pPr>
           <a:r>
-            <a:rPr lang="en-US"/>
-            <a:t>What do you think of the game? Be honest!</a:t>
+            <a:rPr lang="en-US" dirty="0"/>
+            <a:t>What do you think of the game so far?</a:t>
           </a:r>
         </a:p>
       </dgm:t>
@@ -2816,14 +2808,14 @@
             <a:buNone/>
           </a:pPr>
           <a:r>
-            <a:rPr lang="en-US" sz="2200" kern="1200" baseline="0"/>
+            <a:rPr lang="en-US" sz="2200" kern="1200" baseline="0" dirty="0"/>
             <a:t>Lighthearted</a:t>
           </a:r>
           <a:r>
-            <a:rPr lang="en-GB" sz="2200" kern="1200" baseline="0"/>
-            <a:t>, and hopefully even funny, but based on real events.</a:t>
+            <a:rPr lang="en-GB" sz="2200" kern="1200" baseline="0" dirty="0"/>
+            <a:t>, hopefully funny, but based on real events.</a:t>
           </a:r>
-          <a:endParaRPr lang="en-US" sz="2200" kern="1200"/>
+          <a:endParaRPr lang="en-US" sz="2200" kern="1200" dirty="0"/>
         </a:p>
       </dsp:txBody>
       <dsp:txXfrm>
@@ -3292,7 +3284,7 @@
           </a:pPr>
           <a:r>
             <a:rPr lang="en-US" sz="2200" kern="1200" baseline="0" dirty="0"/>
-            <a:t>Full of different characters trying to use the toll road.</a:t>
+            <a:t>Full of different characters and their cargo trying to use the toll road.</a:t>
           </a:r>
           <a:endParaRPr lang="en-US" sz="2200" kern="1200" dirty="0"/>
         </a:p>
@@ -3448,7 +3440,7 @@
         </a:bodyPr>
         <a:lstStyle/>
         <a:p>
-          <a:pPr marL="0" lvl="0" indent="0" algn="l" defTabSz="800100">
+          <a:pPr marL="0" lvl="0" indent="0" algn="l" defTabSz="977900">
             <a:lnSpc>
               <a:spcPct val="100000"/>
             </a:lnSpc>
@@ -3461,16 +3453,8 @@
             <a:buNone/>
           </a:pPr>
           <a:r>
-            <a:rPr lang="en-US" sz="1800" kern="1200"/>
-            <a:t>Is there any museum displays that </a:t>
-          </a:r>
-          <a:r>
-            <a:rPr lang="en-US" sz="1800" b="1" kern="1200"/>
-            <a:t>you</a:t>
-          </a:r>
-          <a:r>
-            <a:rPr lang="en-US" sz="1800" kern="1200"/>
-            <a:t> really liked that you could tell me about?</a:t>
+            <a:rPr lang="en-US" sz="2200" kern="1200" dirty="0"/>
+            <a:t>Is there any museum displays that you’ve seen that have stuck with you?</a:t>
           </a:r>
         </a:p>
       </dsp:txBody>
@@ -3613,7 +3597,7 @@
         </a:bodyPr>
         <a:lstStyle/>
         <a:p>
-          <a:pPr marL="0" lvl="0" indent="0" algn="l" defTabSz="800100">
+          <a:pPr marL="0" lvl="0" indent="0" algn="l" defTabSz="977900">
             <a:lnSpc>
               <a:spcPct val="100000"/>
             </a:lnSpc>
@@ -3626,8 +3610,8 @@
             <a:buNone/>
           </a:pPr>
           <a:r>
-            <a:rPr lang="en-US" sz="1800" kern="1200" dirty="0"/>
-            <a:t>Since I want my game to be very story based, have you played any story-based games that you’ve really liked? </a:t>
+            <a:rPr lang="en-US" sz="2200" kern="1200" dirty="0"/>
+            <a:t>Since I want my game to be very story based, what elements make a good story in your opinion?</a:t>
           </a:r>
         </a:p>
       </dsp:txBody>
@@ -3770,7 +3754,7 @@
         </a:bodyPr>
         <a:lstStyle/>
         <a:p>
-          <a:pPr marL="0" lvl="0" indent="0" algn="l" defTabSz="800100">
+          <a:pPr marL="0" lvl="0" indent="0" algn="l" defTabSz="977900">
             <a:lnSpc>
               <a:spcPct val="100000"/>
             </a:lnSpc>
@@ -3783,7 +3767,7 @@
             <a:buNone/>
           </a:pPr>
           <a:r>
-            <a:rPr lang="en-US" sz="1800" kern="1200"/>
+            <a:rPr lang="en-US" sz="2200" kern="1200" dirty="0"/>
             <a:t>Do you have any ideas for this game? What kind of things would you add if you were making it?</a:t>
           </a:r>
         </a:p>
@@ -3927,7 +3911,7 @@
         </a:bodyPr>
         <a:lstStyle/>
         <a:p>
-          <a:pPr marL="0" lvl="0" indent="0" algn="l" defTabSz="800100">
+          <a:pPr marL="0" lvl="0" indent="0" algn="l" defTabSz="977900">
             <a:lnSpc>
               <a:spcPct val="100000"/>
             </a:lnSpc>
@@ -3940,8 +3924,8 @@
             <a:buNone/>
           </a:pPr>
           <a:r>
-            <a:rPr lang="en-US" sz="1800" kern="1200"/>
-            <a:t>What do you think of the game? Be honest!</a:t>
+            <a:rPr lang="en-US" sz="2200" kern="1200" dirty="0"/>
+            <a:t>What do you think of the game so far?</a:t>
           </a:r>
         </a:p>
       </dsp:txBody>
@@ -11524,6 +11508,15 @@
         <p:blipFill rotWithShape="1">
           <a:blip r:embed="rId3">
             <a:extLst>
+              <a:ext uri="{BEBA8EAE-BF5A-486C-A8C5-ECC9F3942E4B}">
+                <a14:imgProps xmlns:a14="http://schemas.microsoft.com/office/drawing/2010/main">
+                  <a14:imgLayer r:embed="rId4">
+                    <a14:imgEffect>
+                      <a14:saturation sat="33000"/>
+                    </a14:imgEffect>
+                  </a14:imgLayer>
+                </a14:imgProps>
+              </a:ext>
               <a:ext uri="{28A0092B-C50C-407E-A947-70E740481C1C}">
                 <a14:useLocalDpi xmlns:a14="http://schemas.microsoft.com/office/drawing/2010/main" val="0"/>
               </a:ext>
@@ -12044,7 +12037,7 @@
             <p:ph idx="1"/>
             <p:extLst>
               <p:ext uri="{D42A27DB-BD31-4B8C-83A1-F6EECF244321}">
-                <p14:modId xmlns:p14="http://schemas.microsoft.com/office/powerpoint/2010/main" val="1636840240"/>
+                <p14:modId xmlns:p14="http://schemas.microsoft.com/office/powerpoint/2010/main" val="1431221181"/>
               </p:ext>
             </p:extLst>
           </p:nvPr>
@@ -12237,7 +12230,7 @@
             <p:ph idx="1"/>
             <p:extLst>
               <p:ext uri="{D42A27DB-BD31-4B8C-83A1-F6EECF244321}">
-                <p14:modId xmlns:p14="http://schemas.microsoft.com/office/powerpoint/2010/main" val="2355310343"/>
+                <p14:modId xmlns:p14="http://schemas.microsoft.com/office/powerpoint/2010/main" val="3483379099"/>
               </p:ext>
             </p:extLst>
           </p:nvPr>

</xml_diff>